<commit_message>
Agrego imágenes del PID en Arduino
</commit_message>
<xml_diff>
--- a/Informe_2/pid_ardu.pptx
+++ b/Informe_2/pid_ardu.pptx
@@ -7,6 +7,7 @@
   <p:sldIdLst>
     <p:sldId id="256" r:id="rId2"/>
     <p:sldId id="257" r:id="rId3"/>
+    <p:sldId id="258" r:id="rId4"/>
   </p:sldIdLst>
   <p:sldSz cx="12192000" cy="6858000"/>
   <p:notesSz cx="6858000" cy="9144000"/>
@@ -105,6 +106,11 @@
       </a:defRPr>
     </a:lvl9pPr>
   </p:defaultTextStyle>
+  <p:extLst>
+    <p:ext uri="{EFAFB233-063F-42B5-8137-9DF3F51BA10A}">
+      <p15:sldGuideLst xmlns:p15="http://schemas.microsoft.com/office/powerpoint/2012/main"/>
+    </p:ext>
+  </p:extLst>
 </p:presentation>
 </file>
 
@@ -257,7 +263,7 @@
           <a:p>
             <a:fld id="{D797E63D-2FC0-4498-BF42-9279BF2DE430}" type="datetimeFigureOut">
               <a:rPr lang="es-AR" smtClean="0"/>
-              <a:t>11/6/2019</a:t>
+              <a:t>20/6/2019</a:t>
             </a:fld>
             <a:endParaRPr lang="es-AR"/>
           </a:p>
@@ -457,7 +463,7 @@
           <a:p>
             <a:fld id="{D797E63D-2FC0-4498-BF42-9279BF2DE430}" type="datetimeFigureOut">
               <a:rPr lang="es-AR" smtClean="0"/>
-              <a:t>11/6/2019</a:t>
+              <a:t>20/6/2019</a:t>
             </a:fld>
             <a:endParaRPr lang="es-AR"/>
           </a:p>
@@ -667,7 +673,7 @@
           <a:p>
             <a:fld id="{D797E63D-2FC0-4498-BF42-9279BF2DE430}" type="datetimeFigureOut">
               <a:rPr lang="es-AR" smtClean="0"/>
-              <a:t>11/6/2019</a:t>
+              <a:t>20/6/2019</a:t>
             </a:fld>
             <a:endParaRPr lang="es-AR"/>
           </a:p>
@@ -867,7 +873,7 @@
           <a:p>
             <a:fld id="{D797E63D-2FC0-4498-BF42-9279BF2DE430}" type="datetimeFigureOut">
               <a:rPr lang="es-AR" smtClean="0"/>
-              <a:t>11/6/2019</a:t>
+              <a:t>20/6/2019</a:t>
             </a:fld>
             <a:endParaRPr lang="es-AR"/>
           </a:p>
@@ -1143,7 +1149,7 @@
           <a:p>
             <a:fld id="{D797E63D-2FC0-4498-BF42-9279BF2DE430}" type="datetimeFigureOut">
               <a:rPr lang="es-AR" smtClean="0"/>
-              <a:t>11/6/2019</a:t>
+              <a:t>20/6/2019</a:t>
             </a:fld>
             <a:endParaRPr lang="es-AR"/>
           </a:p>
@@ -1411,7 +1417,7 @@
           <a:p>
             <a:fld id="{D797E63D-2FC0-4498-BF42-9279BF2DE430}" type="datetimeFigureOut">
               <a:rPr lang="es-AR" smtClean="0"/>
-              <a:t>11/6/2019</a:t>
+              <a:t>20/6/2019</a:t>
             </a:fld>
             <a:endParaRPr lang="es-AR"/>
           </a:p>
@@ -1826,7 +1832,7 @@
           <a:p>
             <a:fld id="{D797E63D-2FC0-4498-BF42-9279BF2DE430}" type="datetimeFigureOut">
               <a:rPr lang="es-AR" smtClean="0"/>
-              <a:t>11/6/2019</a:t>
+              <a:t>20/6/2019</a:t>
             </a:fld>
             <a:endParaRPr lang="es-AR"/>
           </a:p>
@@ -1968,7 +1974,7 @@
           <a:p>
             <a:fld id="{D797E63D-2FC0-4498-BF42-9279BF2DE430}" type="datetimeFigureOut">
               <a:rPr lang="es-AR" smtClean="0"/>
-              <a:t>11/6/2019</a:t>
+              <a:t>20/6/2019</a:t>
             </a:fld>
             <a:endParaRPr lang="es-AR"/>
           </a:p>
@@ -2081,7 +2087,7 @@
           <a:p>
             <a:fld id="{D797E63D-2FC0-4498-BF42-9279BF2DE430}" type="datetimeFigureOut">
               <a:rPr lang="es-AR" smtClean="0"/>
-              <a:t>11/6/2019</a:t>
+              <a:t>20/6/2019</a:t>
             </a:fld>
             <a:endParaRPr lang="es-AR"/>
           </a:p>
@@ -2394,7 +2400,7 @@
           <a:p>
             <a:fld id="{D797E63D-2FC0-4498-BF42-9279BF2DE430}" type="datetimeFigureOut">
               <a:rPr lang="es-AR" smtClean="0"/>
-              <a:t>11/6/2019</a:t>
+              <a:t>20/6/2019</a:t>
             </a:fld>
             <a:endParaRPr lang="es-AR"/>
           </a:p>
@@ -2683,7 +2689,7 @@
           <a:p>
             <a:fld id="{D797E63D-2FC0-4498-BF42-9279BF2DE430}" type="datetimeFigureOut">
               <a:rPr lang="es-AR" smtClean="0"/>
-              <a:t>11/6/2019</a:t>
+              <a:t>20/6/2019</a:t>
             </a:fld>
             <a:endParaRPr lang="es-AR"/>
           </a:p>
@@ -2926,7 +2932,7 @@
           <a:p>
             <a:fld id="{D797E63D-2FC0-4498-BF42-9279BF2DE430}" type="datetimeFigureOut">
               <a:rPr lang="es-AR" smtClean="0"/>
-              <a:t>11/6/2019</a:t>
+              <a:t>20/6/2019</a:t>
             </a:fld>
             <a:endParaRPr lang="es-AR"/>
           </a:p>
@@ -3357,22 +3363,109 @@
           </p:cNvPicPr>
           <p:nvPr/>
         </p:nvPicPr>
-        <p:blipFill>
+        <p:blipFill rotWithShape="1">
           <a:blip r:embed="rId2"/>
-          <a:stretch>
-            <a:fillRect/>
-          </a:stretch>
+          <a:srcRect t="5001" r="-164" b="9722"/>
+          <a:stretch/>
         </p:blipFill>
         <p:spPr>
           <a:xfrm>
-            <a:off x="0" y="0"/>
-            <a:ext cx="12192000" cy="6858000"/>
+            <a:off x="680707" y="390526"/>
+            <a:ext cx="11484823" cy="5500136"/>
           </a:xfrm>
           <a:prstGeom prst="rect">
             <a:avLst/>
           </a:prstGeom>
         </p:spPr>
       </p:pic>
+      <p:sp>
+        <p:nvSpPr>
+          <p:cNvPr id="2" name="CuadroTexto 1">
+            <a:extLst>
+              <a:ext uri="{FF2B5EF4-FFF2-40B4-BE49-F238E27FC236}">
+                <a16:creationId xmlns:a16="http://schemas.microsoft.com/office/drawing/2014/main" id="{86BCA973-6CA9-4FF2-A33E-6EEC2F39A8E9}"/>
+              </a:ext>
+            </a:extLst>
+          </p:cNvPr>
+          <p:cNvSpPr txBox="1"/>
+          <p:nvPr/>
+        </p:nvSpPr>
+        <p:spPr>
+          <a:xfrm>
+            <a:off x="876300" y="5981700"/>
+            <a:ext cx="11191875" cy="707886"/>
+          </a:xfrm>
+          <a:prstGeom prst="rect">
+            <a:avLst/>
+          </a:prstGeom>
+          <a:noFill/>
+        </p:spPr>
+        <p:txBody>
+          <a:bodyPr wrap="square" rtlCol="0">
+            <a:spAutoFit/>
+          </a:bodyPr>
+          <a:lstStyle/>
+          <a:p>
+            <a:pPr algn="ctr"/>
+            <a:r>
+              <a:rPr lang="es-AR" sz="4000" dirty="0"/>
+              <a:t>Tiempo [</a:t>
+            </a:r>
+            <a:r>
+              <a:rPr lang="es-AR" sz="4000" dirty="0" err="1"/>
+              <a:t>u.a</a:t>
+            </a:r>
+            <a:r>
+              <a:rPr lang="es-AR" sz="4000" dirty="0"/>
+              <a:t>.]</a:t>
+            </a:r>
+          </a:p>
+        </p:txBody>
+      </p:sp>
+      <p:sp>
+        <p:nvSpPr>
+          <p:cNvPr id="4" name="CuadroTexto 3">
+            <a:extLst>
+              <a:ext uri="{FF2B5EF4-FFF2-40B4-BE49-F238E27FC236}">
+                <a16:creationId xmlns:a16="http://schemas.microsoft.com/office/drawing/2014/main" id="{469EB866-5C95-4D7A-9F0E-9E0BA01D7857}"/>
+              </a:ext>
+            </a:extLst>
+          </p:cNvPr>
+          <p:cNvSpPr txBox="1"/>
+          <p:nvPr/>
+        </p:nvSpPr>
+        <p:spPr>
+          <a:xfrm rot="16200000">
+            <a:off x="-2405132" y="2778926"/>
+            <a:ext cx="5423134" cy="646331"/>
+          </a:xfrm>
+          <a:prstGeom prst="rect">
+            <a:avLst/>
+          </a:prstGeom>
+          <a:noFill/>
+        </p:spPr>
+        <p:txBody>
+          <a:bodyPr wrap="square" rtlCol="0">
+            <a:spAutoFit/>
+          </a:bodyPr>
+          <a:lstStyle/>
+          <a:p>
+            <a:pPr algn="ctr"/>
+            <a:r>
+              <a:rPr lang="es-AR" sz="3600" dirty="0"/>
+              <a:t>Intensidad lumínica [</a:t>
+            </a:r>
+            <a:r>
+              <a:rPr lang="es-AR" sz="3600" dirty="0" err="1"/>
+              <a:t>u.a</a:t>
+            </a:r>
+            <a:r>
+              <a:rPr lang="es-AR" sz="3600" dirty="0"/>
+              <a:t>.]</a:t>
+            </a:r>
+          </a:p>
+        </p:txBody>
+      </p:sp>
     </p:spTree>
     <p:extLst>
       <p:ext uri="{BB962C8B-B14F-4D97-AF65-F5344CB8AC3E}">
@@ -3417,26 +3510,266 @@
           </p:cNvPicPr>
           <p:nvPr/>
         </p:nvPicPr>
-        <p:blipFill>
+        <p:blipFill rotWithShape="1">
           <a:blip r:embed="rId2"/>
-          <a:stretch>
-            <a:fillRect/>
-          </a:stretch>
+          <a:srcRect t="4597" b="9314"/>
+          <a:stretch/>
         </p:blipFill>
         <p:spPr>
           <a:xfrm>
-            <a:off x="0" y="0"/>
-            <a:ext cx="12192000" cy="6858000"/>
+            <a:off x="761999" y="619025"/>
+            <a:ext cx="11249025" cy="5447290"/>
           </a:xfrm>
           <a:prstGeom prst="rect">
             <a:avLst/>
           </a:prstGeom>
         </p:spPr>
       </p:pic>
+      <p:sp>
+        <p:nvSpPr>
+          <p:cNvPr id="3" name="CuadroTexto 2">
+            <a:extLst>
+              <a:ext uri="{FF2B5EF4-FFF2-40B4-BE49-F238E27FC236}">
+                <a16:creationId xmlns:a16="http://schemas.microsoft.com/office/drawing/2014/main" id="{A40EC5AF-543D-41E0-8467-7D9586547044}"/>
+              </a:ext>
+            </a:extLst>
+          </p:cNvPr>
+          <p:cNvSpPr txBox="1"/>
+          <p:nvPr/>
+        </p:nvSpPr>
+        <p:spPr>
+          <a:xfrm>
+            <a:off x="876300" y="5981700"/>
+            <a:ext cx="11191875" cy="707886"/>
+          </a:xfrm>
+          <a:prstGeom prst="rect">
+            <a:avLst/>
+          </a:prstGeom>
+          <a:noFill/>
+        </p:spPr>
+        <p:txBody>
+          <a:bodyPr wrap="square" rtlCol="0">
+            <a:spAutoFit/>
+          </a:bodyPr>
+          <a:lstStyle/>
+          <a:p>
+            <a:pPr algn="ctr"/>
+            <a:r>
+              <a:rPr lang="es-AR" sz="4000" dirty="0"/>
+              <a:t>Tiempo [</a:t>
+            </a:r>
+            <a:r>
+              <a:rPr lang="es-AR" sz="4000" dirty="0" err="1"/>
+              <a:t>u.a</a:t>
+            </a:r>
+            <a:r>
+              <a:rPr lang="es-AR" sz="4000" dirty="0"/>
+              <a:t>.]</a:t>
+            </a:r>
+          </a:p>
+        </p:txBody>
+      </p:sp>
+      <p:sp>
+        <p:nvSpPr>
+          <p:cNvPr id="4" name="CuadroTexto 3">
+            <a:extLst>
+              <a:ext uri="{FF2B5EF4-FFF2-40B4-BE49-F238E27FC236}">
+                <a16:creationId xmlns:a16="http://schemas.microsoft.com/office/drawing/2014/main" id="{CC15C234-71A5-4A9A-80F1-42D5F7D7DA17}"/>
+              </a:ext>
+            </a:extLst>
+          </p:cNvPr>
+          <p:cNvSpPr txBox="1"/>
+          <p:nvPr/>
+        </p:nvSpPr>
+        <p:spPr>
+          <a:xfrm rot="16200000">
+            <a:off x="-2405132" y="2778926"/>
+            <a:ext cx="5423134" cy="646331"/>
+          </a:xfrm>
+          <a:prstGeom prst="rect">
+            <a:avLst/>
+          </a:prstGeom>
+          <a:noFill/>
+        </p:spPr>
+        <p:txBody>
+          <a:bodyPr wrap="square" rtlCol="0">
+            <a:spAutoFit/>
+          </a:bodyPr>
+          <a:lstStyle/>
+          <a:p>
+            <a:pPr algn="ctr"/>
+            <a:r>
+              <a:rPr lang="es-AR" sz="3600" dirty="0"/>
+              <a:t>Intensidad lumínica [</a:t>
+            </a:r>
+            <a:r>
+              <a:rPr lang="es-AR" sz="3600" dirty="0" err="1"/>
+              <a:t>u.a</a:t>
+            </a:r>
+            <a:r>
+              <a:rPr lang="es-AR" sz="3600" dirty="0"/>
+              <a:t>.]</a:t>
+            </a:r>
+          </a:p>
+        </p:txBody>
+      </p:sp>
     </p:spTree>
     <p:extLst>
       <p:ext uri="{BB962C8B-B14F-4D97-AF65-F5344CB8AC3E}">
         <p14:creationId xmlns:p14="http://schemas.microsoft.com/office/powerpoint/2010/main" val="4057516427"/>
+      </p:ext>
+    </p:extLst>
+  </p:cSld>
+  <p:clrMapOvr>
+    <a:masterClrMapping/>
+  </p:clrMapOvr>
+</p:sld>
+</file>
+
+<file path=ppt/slides/slide3.xml><?xml version="1.0" encoding="utf-8"?>
+<p:sld xmlns:a="http://schemas.openxmlformats.org/drawingml/2006/main" xmlns:r="http://schemas.openxmlformats.org/officeDocument/2006/relationships" xmlns:p="http://schemas.openxmlformats.org/presentationml/2006/main">
+  <p:cSld>
+    <p:spTree>
+      <p:nvGrpSpPr>
+        <p:cNvPr id="1" name=""/>
+        <p:cNvGrpSpPr/>
+        <p:nvPr/>
+      </p:nvGrpSpPr>
+      <p:grpSpPr>
+        <a:xfrm>
+          <a:off x="0" y="0"/>
+          <a:ext cx="0" cy="0"/>
+          <a:chOff x="0" y="0"/>
+          <a:chExt cx="0" cy="0"/>
+        </a:xfrm>
+      </p:grpSpPr>
+      <p:pic>
+        <p:nvPicPr>
+          <p:cNvPr id="5" name="Imagen 4" descr="Imagen que contiene interior, sentado, mesa&#10;&#10;Descripción generada automáticamente">
+            <a:extLst>
+              <a:ext uri="{FF2B5EF4-FFF2-40B4-BE49-F238E27FC236}">
+                <a16:creationId xmlns:a16="http://schemas.microsoft.com/office/drawing/2014/main" id="{ECBA6BCD-09BE-470A-992B-3B8B2C08D36A}"/>
+              </a:ext>
+            </a:extLst>
+          </p:cNvPr>
+          <p:cNvPicPr>
+            <a:picLocks noChangeAspect="1"/>
+          </p:cNvPicPr>
+          <p:nvPr/>
+        </p:nvPicPr>
+        <p:blipFill rotWithShape="1">
+          <a:blip r:embed="rId2">
+            <a:extLst>
+              <a:ext uri="{28A0092B-C50C-407E-A947-70E740481C1C}">
+                <a14:useLocalDpi xmlns:a14="http://schemas.microsoft.com/office/drawing/2010/main" val="0"/>
+              </a:ext>
+            </a:extLst>
+          </a:blip>
+          <a:srcRect t="5364" b="9579"/>
+          <a:stretch/>
+        </p:blipFill>
+        <p:spPr>
+          <a:xfrm>
+            <a:off x="770021" y="534900"/>
+            <a:ext cx="11334838" cy="5423134"/>
+          </a:xfrm>
+          <a:prstGeom prst="rect">
+            <a:avLst/>
+          </a:prstGeom>
+        </p:spPr>
+      </p:pic>
+      <p:sp>
+        <p:nvSpPr>
+          <p:cNvPr id="6" name="CuadroTexto 5">
+            <a:extLst>
+              <a:ext uri="{FF2B5EF4-FFF2-40B4-BE49-F238E27FC236}">
+                <a16:creationId xmlns:a16="http://schemas.microsoft.com/office/drawing/2014/main" id="{417FB12D-ED9A-4C63-A58D-09CCA1498715}"/>
+              </a:ext>
+            </a:extLst>
+          </p:cNvPr>
+          <p:cNvSpPr txBox="1"/>
+          <p:nvPr/>
+        </p:nvSpPr>
+        <p:spPr>
+          <a:xfrm>
+            <a:off x="876300" y="5981700"/>
+            <a:ext cx="11191875" cy="707886"/>
+          </a:xfrm>
+          <a:prstGeom prst="rect">
+            <a:avLst/>
+          </a:prstGeom>
+          <a:noFill/>
+        </p:spPr>
+        <p:txBody>
+          <a:bodyPr wrap="square" rtlCol="0">
+            <a:spAutoFit/>
+          </a:bodyPr>
+          <a:lstStyle/>
+          <a:p>
+            <a:pPr algn="ctr"/>
+            <a:r>
+              <a:rPr lang="es-AR" sz="4000" dirty="0"/>
+              <a:t>Tiempo [</a:t>
+            </a:r>
+            <a:r>
+              <a:rPr lang="es-AR" sz="4000" dirty="0" err="1"/>
+              <a:t>u.a</a:t>
+            </a:r>
+            <a:r>
+              <a:rPr lang="es-AR" sz="4000" dirty="0"/>
+              <a:t>.]</a:t>
+            </a:r>
+          </a:p>
+        </p:txBody>
+      </p:sp>
+      <p:sp>
+        <p:nvSpPr>
+          <p:cNvPr id="7" name="CuadroTexto 6">
+            <a:extLst>
+              <a:ext uri="{FF2B5EF4-FFF2-40B4-BE49-F238E27FC236}">
+                <a16:creationId xmlns:a16="http://schemas.microsoft.com/office/drawing/2014/main" id="{4EE9CD01-8DC4-476B-8B08-5F9D90FEE2E0}"/>
+              </a:ext>
+            </a:extLst>
+          </p:cNvPr>
+          <p:cNvSpPr txBox="1"/>
+          <p:nvPr/>
+        </p:nvSpPr>
+        <p:spPr>
+          <a:xfrm rot="16200000">
+            <a:off x="-2405132" y="2778926"/>
+            <a:ext cx="5423134" cy="646331"/>
+          </a:xfrm>
+          <a:prstGeom prst="rect">
+            <a:avLst/>
+          </a:prstGeom>
+          <a:noFill/>
+        </p:spPr>
+        <p:txBody>
+          <a:bodyPr wrap="square" rtlCol="0">
+            <a:spAutoFit/>
+          </a:bodyPr>
+          <a:lstStyle/>
+          <a:p>
+            <a:pPr algn="ctr"/>
+            <a:r>
+              <a:rPr lang="es-AR" sz="3600" dirty="0"/>
+              <a:t>Intensidad lumínica [</a:t>
+            </a:r>
+            <a:r>
+              <a:rPr lang="es-AR" sz="3600" dirty="0" err="1"/>
+              <a:t>u.a</a:t>
+            </a:r>
+            <a:r>
+              <a:rPr lang="es-AR" sz="3600" dirty="0"/>
+              <a:t>.]</a:t>
+            </a:r>
+          </a:p>
+        </p:txBody>
+      </p:sp>
+    </p:spTree>
+    <p:extLst>
+      <p:ext uri="{BB962C8B-B14F-4D97-AF65-F5344CB8AC3E}">
+        <p14:creationId xmlns:p14="http://schemas.microsoft.com/office/powerpoint/2010/main" val="2814094284"/>
       </p:ext>
     </p:extLst>
   </p:cSld>

</xml_diff>